<commit_message>
Moved fade-anim to global stylesheet, added fade animation to lunch-app
</commit_message>
<xml_diff>
--- a/webui/app/cats/design_proposal.pptx
+++ b/webui/app/cats/design_proposal.pptx
@@ -4716,8 +4716,8 @@
         </p:nvSpPr>
         <p:spPr bwMode="auto">
           <a:xfrm>
-            <a:off x="208111" y="2644304"/>
-            <a:ext cx="3012426" cy="6836816"/>
+            <a:off x="208111" y="3144416"/>
+            <a:ext cx="3012426" cy="6336704"/>
           </a:xfrm>
           <a:prstGeom prst="roundRect">
             <a:avLst>
@@ -4784,7 +4784,7 @@
         </p:nvSpPr>
         <p:spPr bwMode="auto">
           <a:xfrm>
-            <a:off x="208111" y="2212256"/>
+            <a:off x="208111" y="2957467"/>
             <a:ext cx="3012877" cy="533400"/>
           </a:xfrm>
           <a:custGeom>
@@ -5102,7 +5102,7 @@
         </p:blipFill>
         <p:spPr bwMode="auto">
           <a:xfrm>
-            <a:off x="208111" y="480120"/>
+            <a:off x="208111" y="984176"/>
             <a:ext cx="3012426" cy="1656184"/>
           </a:xfrm>
           <a:prstGeom prst="rect">
@@ -5151,7 +5151,7 @@
         </p:nvGrpSpPr>
         <p:grpSpPr>
           <a:xfrm>
-            <a:off x="208111" y="2745656"/>
+            <a:off x="208111" y="3497387"/>
             <a:ext cx="3012877" cy="736574"/>
             <a:chOff x="208111" y="2597696"/>
             <a:chExt cx="3012877" cy="736574"/>
@@ -5371,7 +5371,7 @@
         </p:nvGrpSpPr>
         <p:grpSpPr>
           <a:xfrm>
-            <a:off x="208111" y="3462343"/>
+            <a:off x="208111" y="4214074"/>
             <a:ext cx="3012877" cy="736574"/>
             <a:chOff x="208111" y="2597696"/>
             <a:chExt cx="3012877" cy="736574"/>
@@ -5591,7 +5591,7 @@
         </p:nvGrpSpPr>
         <p:grpSpPr>
           <a:xfrm>
-            <a:off x="208111" y="4198917"/>
+            <a:off x="208111" y="4950648"/>
             <a:ext cx="3012877" cy="736574"/>
             <a:chOff x="208111" y="2597696"/>
             <a:chExt cx="3012877" cy="736574"/>
@@ -5823,7 +5823,7 @@
         </p:nvGrpSpPr>
         <p:grpSpPr>
           <a:xfrm>
-            <a:off x="208111" y="4935491"/>
+            <a:off x="208111" y="5687222"/>
             <a:ext cx="3012877" cy="736574"/>
             <a:chOff x="208111" y="2597696"/>
             <a:chExt cx="3012877" cy="736574"/>
@@ -6043,7 +6043,7 @@
         </p:nvSpPr>
         <p:spPr>
           <a:xfrm>
-            <a:off x="208111" y="5672065"/>
+            <a:off x="208111" y="6423796"/>
             <a:ext cx="3012877" cy="736574"/>
           </a:xfrm>
           <a:prstGeom prst="rect">
@@ -6168,7 +6168,7 @@
         </p:nvGrpSpPr>
         <p:grpSpPr>
           <a:xfrm>
-            <a:off x="208111" y="6408639"/>
+            <a:off x="208111" y="7160370"/>
             <a:ext cx="3012877" cy="736574"/>
             <a:chOff x="208111" y="2597696"/>
             <a:chExt cx="3012877" cy="736574"/>
@@ -6402,8 +6402,8 @@
         </p:nvSpPr>
         <p:spPr bwMode="auto">
           <a:xfrm>
-            <a:off x="3307010" y="2644304"/>
-            <a:ext cx="9214469" cy="6836816"/>
+            <a:off x="3307010" y="3084374"/>
+            <a:ext cx="9214469" cy="6396745"/>
           </a:xfrm>
           <a:prstGeom prst="roundRect">
             <a:avLst>
@@ -6470,7 +6470,7 @@
         </p:nvSpPr>
         <p:spPr bwMode="auto">
           <a:xfrm>
-            <a:off x="3307011" y="2212256"/>
+            <a:off x="3307011" y="2971056"/>
             <a:ext cx="9215849" cy="533400"/>
           </a:xfrm>
           <a:custGeom>
@@ -6627,7 +6627,7 @@
         </p:nvSpPr>
         <p:spPr bwMode="auto">
           <a:xfrm>
-            <a:off x="2307332" y="3859560"/>
+            <a:off x="2307332" y="4611291"/>
             <a:ext cx="2057400" cy="1130300"/>
           </a:xfrm>
           <a:prstGeom prst="roundRect">
@@ -6865,7 +6865,7 @@
         </p:nvSpPr>
         <p:spPr>
           <a:xfrm>
-            <a:off x="1349394" y="4503578"/>
+            <a:off x="1349394" y="5255309"/>
             <a:ext cx="241426" cy="241426"/>
           </a:xfrm>
           <a:prstGeom prst="ellipse">
@@ -6909,7 +6909,7 @@
         </p:nvSpPr>
         <p:spPr>
           <a:xfrm>
-            <a:off x="4024536" y="3957491"/>
+            <a:off x="4024536" y="4709222"/>
             <a:ext cx="241426" cy="241426"/>
           </a:xfrm>
           <a:prstGeom prst="ellipse">
@@ -6953,7 +6953,7 @@
         </p:nvSpPr>
         <p:spPr>
           <a:xfrm>
-            <a:off x="208111" y="120080"/>
+            <a:off x="208111" y="624136"/>
             <a:ext cx="12313368" cy="144016"/>
           </a:xfrm>
           <a:prstGeom prst="rect">
@@ -6999,7 +6999,7 @@
         </p:nvSpPr>
         <p:spPr>
           <a:xfrm>
-            <a:off x="492727" y="120080"/>
+            <a:off x="492727" y="624136"/>
             <a:ext cx="207641" cy="144016"/>
           </a:xfrm>
           <a:prstGeom prst="rect">
@@ -7045,7 +7045,7 @@
         </p:nvSpPr>
         <p:spPr>
           <a:xfrm>
-            <a:off x="2944416" y="120080"/>
+            <a:off x="2944416" y="624136"/>
             <a:ext cx="792088" cy="144016"/>
           </a:xfrm>
           <a:prstGeom prst="rect">
@@ -7091,7 +7091,7 @@
         </p:nvSpPr>
         <p:spPr>
           <a:xfrm>
-            <a:off x="4168552" y="120080"/>
+            <a:off x="4168552" y="624136"/>
             <a:ext cx="120713" cy="144016"/>
           </a:xfrm>
           <a:prstGeom prst="rect">
@@ -7137,7 +7137,7 @@
         </p:nvSpPr>
         <p:spPr>
           <a:xfrm>
-            <a:off x="8128992" y="128464"/>
+            <a:off x="8128992" y="632520"/>
             <a:ext cx="792088" cy="135632"/>
           </a:xfrm>
           <a:prstGeom prst="rect">
@@ -7183,7 +7183,7 @@
         </p:nvSpPr>
         <p:spPr>
           <a:xfrm>
-            <a:off x="208111" y="120080"/>
+            <a:off x="208111" y="624136"/>
             <a:ext cx="284616" cy="144016"/>
           </a:xfrm>
           <a:prstGeom prst="rect">
@@ -7229,7 +7229,7 @@
         </p:nvSpPr>
         <p:spPr>
           <a:xfrm>
-            <a:off x="700368" y="120080"/>
+            <a:off x="700368" y="624136"/>
             <a:ext cx="155816" cy="144016"/>
           </a:xfrm>
           <a:prstGeom prst="rect">
@@ -7275,7 +7275,7 @@
         </p:nvSpPr>
         <p:spPr>
           <a:xfrm>
-            <a:off x="3736504" y="124272"/>
+            <a:off x="3736504" y="628328"/>
             <a:ext cx="284616" cy="139824"/>
           </a:xfrm>
           <a:prstGeom prst="rect">
@@ -7321,7 +7321,7 @@
         </p:nvSpPr>
         <p:spPr>
           <a:xfrm>
-            <a:off x="4289264" y="120080"/>
+            <a:off x="4289264" y="624136"/>
             <a:ext cx="671375" cy="144016"/>
           </a:xfrm>
           <a:prstGeom prst="rect">
@@ -7367,7 +7367,7 @@
         </p:nvSpPr>
         <p:spPr>
           <a:xfrm>
-            <a:off x="1008584" y="120080"/>
+            <a:off x="1008584" y="624136"/>
             <a:ext cx="855712" cy="144016"/>
           </a:xfrm>
           <a:prstGeom prst="rect">
@@ -7413,7 +7413,7 @@
         </p:nvSpPr>
         <p:spPr>
           <a:xfrm>
-            <a:off x="1992884" y="120080"/>
+            <a:off x="1992884" y="624136"/>
             <a:ext cx="855712" cy="144016"/>
           </a:xfrm>
           <a:prstGeom prst="rect">
@@ -7459,7 +7459,7 @@
         </p:nvSpPr>
         <p:spPr>
           <a:xfrm>
-            <a:off x="5104656" y="120080"/>
+            <a:off x="5104656" y="624136"/>
             <a:ext cx="855712" cy="144016"/>
           </a:xfrm>
           <a:prstGeom prst="rect">
@@ -7505,7 +7505,7 @@
         </p:nvSpPr>
         <p:spPr>
           <a:xfrm>
-            <a:off x="6112768" y="120080"/>
+            <a:off x="6112768" y="624136"/>
             <a:ext cx="855712" cy="144016"/>
           </a:xfrm>
           <a:prstGeom prst="rect">
@@ -7551,7 +7551,7 @@
         </p:nvSpPr>
         <p:spPr>
           <a:xfrm>
-            <a:off x="7120880" y="120080"/>
+            <a:off x="7120880" y="624136"/>
             <a:ext cx="855712" cy="144016"/>
           </a:xfrm>
           <a:prstGeom prst="rect">
@@ -7597,7 +7597,7 @@
         </p:nvSpPr>
         <p:spPr>
           <a:xfrm>
-            <a:off x="9073480" y="128464"/>
+            <a:off x="9073480" y="632520"/>
             <a:ext cx="792088" cy="135632"/>
           </a:xfrm>
           <a:prstGeom prst="rect">
@@ -7643,7 +7643,7 @@
         </p:nvSpPr>
         <p:spPr>
           <a:xfrm>
-            <a:off x="10001200" y="120080"/>
+            <a:off x="10001200" y="624136"/>
             <a:ext cx="855712" cy="144016"/>
           </a:xfrm>
           <a:prstGeom prst="rect">
@@ -7689,7 +7689,7 @@
         </p:nvSpPr>
         <p:spPr>
           <a:xfrm>
-            <a:off x="11009312" y="120080"/>
+            <a:off x="11009312" y="624136"/>
             <a:ext cx="855712" cy="144016"/>
           </a:xfrm>
           <a:prstGeom prst="rect">
@@ -7735,7 +7735,7 @@
         </p:nvSpPr>
         <p:spPr>
           <a:xfrm>
-            <a:off x="12093623" y="120080"/>
+            <a:off x="12093623" y="624136"/>
             <a:ext cx="429237" cy="144016"/>
           </a:xfrm>
           <a:prstGeom prst="rect">
@@ -7781,7 +7781,7 @@
         </p:nvSpPr>
         <p:spPr>
           <a:xfrm>
-            <a:off x="208111" y="264096"/>
+            <a:off x="208111" y="768152"/>
             <a:ext cx="4156621" cy="144840"/>
           </a:xfrm>
           <a:prstGeom prst="rect">
@@ -7837,7 +7837,7 @@
         </p:nvSpPr>
         <p:spPr>
           <a:xfrm>
-            <a:off x="4384575" y="264920"/>
+            <a:off x="4384575" y="768976"/>
             <a:ext cx="3960441" cy="144016"/>
           </a:xfrm>
           <a:prstGeom prst="rect">
@@ -7893,7 +7893,7 @@
         </p:nvSpPr>
         <p:spPr>
           <a:xfrm>
-            <a:off x="8345017" y="264920"/>
+            <a:off x="8345017" y="768976"/>
             <a:ext cx="4177844" cy="144016"/>
           </a:xfrm>
           <a:prstGeom prst="rect">
@@ -7949,7 +7949,7 @@
         </p:nvCxnSpPr>
         <p:spPr>
           <a:xfrm>
-            <a:off x="4292280" y="51852"/>
+            <a:off x="4292280" y="555908"/>
             <a:ext cx="0" cy="288856"/>
           </a:xfrm>
           <a:prstGeom prst="line">
@@ -7988,7 +7988,7 @@
         </p:nvCxnSpPr>
         <p:spPr>
           <a:xfrm>
-            <a:off x="8115972" y="59824"/>
+            <a:off x="8115972" y="563880"/>
             <a:ext cx="0" cy="288856"/>
           </a:xfrm>
           <a:prstGeom prst="line">
@@ -8029,7 +8029,7 @@
         </p:nvSpPr>
         <p:spPr bwMode="auto">
           <a:xfrm>
-            <a:off x="3461828" y="768184"/>
+            <a:off x="3461828" y="1920280"/>
             <a:ext cx="1440000" cy="288000"/>
           </a:xfrm>
           <a:prstGeom prst="roundRect">
@@ -8099,7 +8099,7 @@
         </p:nvSpPr>
         <p:spPr bwMode="auto">
           <a:xfrm>
-            <a:off x="4996963" y="768184"/>
+            <a:off x="4996963" y="1920280"/>
             <a:ext cx="1440000" cy="288000"/>
           </a:xfrm>
           <a:prstGeom prst="roundRect">
@@ -8174,7 +8174,7 @@
         </p:nvSpPr>
         <p:spPr bwMode="auto">
           <a:xfrm>
-            <a:off x="6526221" y="768184"/>
+            <a:off x="6526221" y="1920280"/>
             <a:ext cx="1440000" cy="288000"/>
           </a:xfrm>
           <a:prstGeom prst="roundRect">
@@ -8249,7 +8249,7 @@
         </p:nvSpPr>
         <p:spPr bwMode="auto">
           <a:xfrm>
-            <a:off x="8055479" y="768184"/>
+            <a:off x="8055479" y="1920280"/>
             <a:ext cx="1440000" cy="288000"/>
           </a:xfrm>
           <a:prstGeom prst="roundRect">
@@ -8323,7 +8323,7 @@
         </p:nvSpPr>
         <p:spPr bwMode="auto">
           <a:xfrm>
-            <a:off x="9580131" y="768184"/>
+            <a:off x="9580131" y="1920280"/>
             <a:ext cx="1440000" cy="288000"/>
           </a:xfrm>
           <a:prstGeom prst="roundRect">
@@ -8393,7 +8393,7 @@
         </p:nvSpPr>
         <p:spPr bwMode="auto">
           <a:xfrm>
-            <a:off x="11081480" y="769335"/>
+            <a:off x="11081480" y="1921431"/>
             <a:ext cx="1440000" cy="288000"/>
           </a:xfrm>
           <a:prstGeom prst="roundRect">
@@ -8463,7 +8463,7 @@
         </p:nvSpPr>
         <p:spPr bwMode="auto">
           <a:xfrm>
-            <a:off x="3461828" y="1128224"/>
+            <a:off x="3461828" y="2280320"/>
             <a:ext cx="1440000" cy="288000"/>
           </a:xfrm>
           <a:prstGeom prst="roundRect">
@@ -8533,7 +8533,7 @@
         </p:nvSpPr>
         <p:spPr bwMode="auto">
           <a:xfrm>
-            <a:off x="3388634" y="2334570"/>
+            <a:off x="3388634" y="3072440"/>
             <a:ext cx="900000" cy="288000"/>
           </a:xfrm>
           <a:prstGeom prst="roundRect">
@@ -8603,7 +8603,7 @@
         </p:nvSpPr>
         <p:spPr bwMode="auto">
           <a:xfrm>
-            <a:off x="11549472" y="2334570"/>
+            <a:off x="11549472" y="3072440"/>
             <a:ext cx="900000" cy="288000"/>
           </a:xfrm>
           <a:prstGeom prst="roundRect">
@@ -8671,7 +8671,7 @@
         </p:nvSpPr>
         <p:spPr>
           <a:xfrm>
-            <a:off x="3648692" y="7073205"/>
+            <a:off x="3648692" y="7883098"/>
             <a:ext cx="8663791" cy="864096"/>
           </a:xfrm>
           <a:prstGeom prst="roundRect">
@@ -8722,7 +8722,7 @@
         </p:nvSpPr>
         <p:spPr>
           <a:xfrm>
-            <a:off x="3720700" y="7145213"/>
+            <a:off x="3720700" y="7955106"/>
             <a:ext cx="1811812" cy="720080"/>
           </a:xfrm>
           <a:prstGeom prst="roundRect">
@@ -8784,7 +8784,7 @@
         </p:nvSpPr>
         <p:spPr>
           <a:xfrm>
-            <a:off x="5532512" y="7145213"/>
+            <a:off x="5532512" y="7955106"/>
             <a:ext cx="2880319" cy="720080"/>
           </a:xfrm>
           <a:prstGeom prst="roundRect">
@@ -8854,7 +8854,7 @@
         </p:nvSpPr>
         <p:spPr>
           <a:xfrm>
-            <a:off x="8412832" y="7145213"/>
+            <a:off x="8412832" y="7955106"/>
             <a:ext cx="3849344" cy="720080"/>
           </a:xfrm>
           <a:prstGeom prst="roundRect">
@@ -8925,7 +8925,7 @@
         </p:nvSpPr>
         <p:spPr bwMode="auto">
           <a:xfrm>
-            <a:off x="4364732" y="2334570"/>
+            <a:off x="4364732" y="3072440"/>
             <a:ext cx="900000" cy="288000"/>
           </a:xfrm>
           <a:prstGeom prst="roundRect">
@@ -8995,7 +8995,7 @@
         </p:nvSpPr>
         <p:spPr bwMode="auto">
           <a:xfrm>
-            <a:off x="10577264" y="2334570"/>
+            <a:off x="10577264" y="3072440"/>
             <a:ext cx="900000" cy="288000"/>
           </a:xfrm>
           <a:prstGeom prst="roundRect">
@@ -9063,7 +9063,7 @@
         </p:nvSpPr>
         <p:spPr>
           <a:xfrm>
-            <a:off x="5104656" y="7384540"/>
+            <a:off x="5104656" y="8194433"/>
             <a:ext cx="241426" cy="241426"/>
           </a:xfrm>
           <a:prstGeom prst="ellipse">
@@ -9106,13 +9106,13 @@
           <p:nvPr>
             <p:extLst>
               <p:ext uri="{D42A27DB-BD31-4B8C-83A1-F6EECF244321}">
-                <p14:modId xmlns:p14="http://schemas.microsoft.com/office/powerpoint/2010/main" val="264921068"/>
+                <p14:modId xmlns:p14="http://schemas.microsoft.com/office/powerpoint/2010/main" val="3962707290"/>
               </p:ext>
             </p:extLst>
           </p:nvPr>
         </p:nvGraphicFramePr>
         <p:xfrm>
-          <a:off x="4364732" y="2898530"/>
+          <a:off x="4364732" y="3708423"/>
           <a:ext cx="7361879" cy="3935483"/>
         </p:xfrm>
         <a:graphic>
@@ -9129,7 +9129,7 @@
         </p:nvCxnSpPr>
         <p:spPr>
           <a:xfrm>
-            <a:off x="3747407" y="7937301"/>
+            <a:off x="3747407" y="8747194"/>
             <a:ext cx="0" cy="288856"/>
           </a:xfrm>
           <a:prstGeom prst="line">
@@ -9168,7 +9168,7 @@
         </p:nvCxnSpPr>
         <p:spPr>
           <a:xfrm>
-            <a:off x="7980587" y="7937301"/>
+            <a:off x="7980587" y="8747194"/>
             <a:ext cx="0" cy="288856"/>
           </a:xfrm>
           <a:prstGeom prst="line">
@@ -9207,7 +9207,7 @@
         </p:nvCxnSpPr>
         <p:spPr>
           <a:xfrm>
-            <a:off x="12262176" y="7937301"/>
+            <a:off x="12262176" y="8747194"/>
             <a:ext cx="0" cy="288856"/>
           </a:xfrm>
           <a:prstGeom prst="line">
@@ -9246,7 +9246,7 @@
         </p:nvSpPr>
         <p:spPr>
           <a:xfrm>
-            <a:off x="3762760" y="7947231"/>
+            <a:off x="3762760" y="8757124"/>
             <a:ext cx="1063194" cy="338554"/>
           </a:xfrm>
           <a:prstGeom prst="rect">
@@ -9276,7 +9276,7 @@
         </p:nvSpPr>
         <p:spPr>
           <a:xfrm>
-            <a:off x="7976592" y="7912452"/>
+            <a:off x="7976592" y="8722345"/>
             <a:ext cx="1063194" cy="338554"/>
           </a:xfrm>
           <a:prstGeom prst="rect">
@@ -9306,7 +9306,7 @@
         </p:nvSpPr>
         <p:spPr>
           <a:xfrm>
-            <a:off x="11198982" y="7947231"/>
+            <a:off x="11198982" y="8757124"/>
             <a:ext cx="1063194" cy="338554"/>
           </a:xfrm>
           <a:prstGeom prst="rect">
@@ -9337,7 +9337,7 @@
         </p:nvSpPr>
         <p:spPr>
           <a:xfrm>
-            <a:off x="12141463" y="8285785"/>
+            <a:off x="12141463" y="9095678"/>
             <a:ext cx="241426" cy="241426"/>
           </a:xfrm>
           <a:prstGeom prst="ellipse">
@@ -9381,7 +9381,7 @@
         </p:nvSpPr>
         <p:spPr>
           <a:xfrm>
-            <a:off x="6364795" y="4364074"/>
+            <a:off x="6364795" y="5173967"/>
             <a:ext cx="241426" cy="241426"/>
           </a:xfrm>
           <a:prstGeom prst="ellipse">
@@ -9426,7 +9426,7 @@
         </p:nvSpPr>
         <p:spPr bwMode="auto">
           <a:xfrm>
-            <a:off x="10145216" y="2936143"/>
+            <a:off x="10145216" y="3746036"/>
             <a:ext cx="2237673" cy="355600"/>
           </a:xfrm>
           <a:prstGeom prst="rect">
@@ -9506,7 +9506,7 @@
         </p:nvSpPr>
         <p:spPr>
           <a:xfrm>
-            <a:off x="12238489" y="2812884"/>
+            <a:off x="12238489" y="3622777"/>
             <a:ext cx="241426" cy="241426"/>
           </a:xfrm>
           <a:prstGeom prst="ellipse">
@@ -9552,7 +9552,7 @@
         </p:nvSpPr>
         <p:spPr bwMode="auto">
           <a:xfrm>
-            <a:off x="2037332" y="5774712"/>
+            <a:off x="2037332" y="6526443"/>
             <a:ext cx="540000" cy="288000"/>
           </a:xfrm>
           <a:prstGeom prst="roundRect">
@@ -9616,7 +9616,7 @@
         </p:nvSpPr>
         <p:spPr bwMode="auto">
           <a:xfrm>
-            <a:off x="2629875" y="5779296"/>
+            <a:off x="2629875" y="6531027"/>
             <a:ext cx="540000" cy="288000"/>
           </a:xfrm>
           <a:prstGeom prst="roundRect">
@@ -9678,7 +9678,7 @@
         </p:nvSpPr>
         <p:spPr>
           <a:xfrm>
-            <a:off x="1622870" y="6040352"/>
+            <a:off x="1622870" y="6792083"/>
             <a:ext cx="241426" cy="241426"/>
           </a:xfrm>
           <a:prstGeom prst="ellipse">
@@ -9722,7 +9722,7 @@
         </p:nvSpPr>
         <p:spPr>
           <a:xfrm>
-            <a:off x="5352122" y="2372027"/>
+            <a:off x="5352122" y="3109897"/>
             <a:ext cx="241426" cy="241426"/>
           </a:xfrm>
           <a:prstGeom prst="ellipse">
@@ -9758,6 +9758,139 @@
           </a:p>
         </p:txBody>
       </p:sp>
+      <p:sp>
+        <p:nvSpPr>
+          <p:cNvPr id="122" name="Rectangle 121"/>
+          <p:cNvSpPr/>
+          <p:nvPr/>
+        </p:nvSpPr>
+        <p:spPr>
+          <a:xfrm>
+            <a:off x="0" y="43178"/>
+            <a:ext cx="12801600" cy="360000"/>
+          </a:xfrm>
+          <a:prstGeom prst="rect">
+            <a:avLst/>
+          </a:prstGeom>
+          <a:solidFill>
+            <a:srgbClr val="E7E7E7"/>
+          </a:solidFill>
+          <a:ln>
+            <a:noFill/>
+          </a:ln>
+        </p:spPr>
+        <p:style>
+          <a:lnRef idx="2">
+            <a:schemeClr val="accent1">
+              <a:shade val="50000"/>
+            </a:schemeClr>
+          </a:lnRef>
+          <a:fillRef idx="1">
+            <a:schemeClr val="accent1"/>
+          </a:fillRef>
+          <a:effectRef idx="0">
+            <a:schemeClr val="accent1"/>
+          </a:effectRef>
+          <a:fontRef idx="minor">
+            <a:schemeClr val="lt1"/>
+          </a:fontRef>
+        </p:style>
+        <p:txBody>
+          <a:bodyPr rtlCol="0" anchor="ctr"/>
+          <a:lstStyle/>
+          <a:p>
+            <a:pPr algn="ctr"/>
+            <a:endParaRPr lang="de-DE"/>
+          </a:p>
+        </p:txBody>
+      </p:sp>
+      <p:sp>
+        <p:nvSpPr>
+          <p:cNvPr id="137" name="Rectangle 136"/>
+          <p:cNvSpPr/>
+          <p:nvPr/>
+        </p:nvSpPr>
+        <p:spPr>
+          <a:xfrm>
+            <a:off x="0" y="-2541"/>
+            <a:ext cx="12801600" cy="45719"/>
+          </a:xfrm>
+          <a:prstGeom prst="rect">
+            <a:avLst/>
+          </a:prstGeom>
+          <a:solidFill>
+            <a:srgbClr val="009DE0"/>
+          </a:solidFill>
+          <a:ln>
+            <a:noFill/>
+          </a:ln>
+        </p:spPr>
+        <p:style>
+          <a:lnRef idx="2">
+            <a:schemeClr val="accent1">
+              <a:shade val="50000"/>
+            </a:schemeClr>
+          </a:lnRef>
+          <a:fillRef idx="1">
+            <a:schemeClr val="accent1"/>
+          </a:fillRef>
+          <a:effectRef idx="0">
+            <a:schemeClr val="accent1"/>
+          </a:effectRef>
+          <a:fontRef idx="minor">
+            <a:schemeClr val="lt1"/>
+          </a:fontRef>
+        </p:style>
+        <p:txBody>
+          <a:bodyPr rtlCol="0" anchor="ctr"/>
+          <a:lstStyle/>
+          <a:p>
+            <a:pPr algn="ctr"/>
+            <a:endParaRPr lang="de-DE"/>
+          </a:p>
+        </p:txBody>
+      </p:sp>
+      <p:pic>
+        <p:nvPicPr>
+          <p:cNvPr id="1029" name="Picture 5" descr="http://localhost:8000/img/bridge-logo-text-grey.png"/>
+          <p:cNvPicPr>
+            <a:picLocks noChangeAspect="1" noChangeArrowheads="1"/>
+          </p:cNvPicPr>
+          <p:nvPr/>
+        </p:nvPicPr>
+        <p:blipFill>
+          <a:blip r:embed="rId5">
+            <a:extLst>
+              <a:ext uri="{28A0092B-C50C-407E-A947-70E740481C1C}">
+                <a14:useLocalDpi xmlns:a14="http://schemas.microsoft.com/office/drawing/2010/main" val="0"/>
+              </a:ext>
+            </a:extLst>
+          </a:blip>
+          <a:srcRect/>
+          <a:stretch>
+            <a:fillRect/>
+          </a:stretch>
+        </p:blipFill>
+        <p:spPr bwMode="auto">
+          <a:xfrm>
+            <a:off x="72672" y="108878"/>
+            <a:ext cx="1047750" cy="228600"/>
+          </a:xfrm>
+          <a:prstGeom prst="rect">
+            <a:avLst/>
+          </a:prstGeom>
+          <a:noFill/>
+          <a:extLst>
+            <a:ext uri="{909E8E84-426E-40DD-AFC4-6F175D3DCCD1}">
+              <a14:hiddenFill xmlns:a14="http://schemas.microsoft.com/office/drawing/2010/main">
+                <a:solidFill>
+                  <a:srgbClr val="FFFFFF"/>
+                </a:solidFill>
+              </a14:hiddenFill>
+            </a:ext>
+          </a:extLst>
+        </p:spPr>
+      </p:pic>
     </p:spTree>
     <p:extLst>
       <p:ext uri="{BB962C8B-B14F-4D97-AF65-F5344CB8AC3E}">

</xml_diff>